<commit_message>
Vorläufige Präsentation + Tabelle | Testergebnisse mit den neuen Hashes | alte Testergebnisse ausgelagert
</commit_message>
<xml_diff>
--- a/Presentation/exa-hashes.pptx
+++ b/Presentation/exa-hashes.pptx
@@ -18,16 +18,15 @@
     <p:sldId id="316" r:id="rId12"/>
     <p:sldId id="317" r:id="rId13"/>
     <p:sldId id="314" r:id="rId14"/>
-    <p:sldId id="315" r:id="rId15"/>
-    <p:sldId id="296" r:id="rId16"/>
-    <p:sldId id="319" r:id="rId17"/>
-    <p:sldId id="320" r:id="rId18"/>
-    <p:sldId id="318" r:id="rId19"/>
-    <p:sldId id="291" r:id="rId20"/>
-    <p:sldId id="275" r:id="rId21"/>
-    <p:sldId id="302" r:id="rId22"/>
-    <p:sldId id="292" r:id="rId23"/>
-    <p:sldId id="276" r:id="rId24"/>
+    <p:sldId id="296" r:id="rId15"/>
+    <p:sldId id="319" r:id="rId16"/>
+    <p:sldId id="320" r:id="rId17"/>
+    <p:sldId id="318" r:id="rId18"/>
+    <p:sldId id="291" r:id="rId19"/>
+    <p:sldId id="275" r:id="rId20"/>
+    <p:sldId id="302" r:id="rId21"/>
+    <p:sldId id="292" r:id="rId22"/>
+    <p:sldId id="276" r:id="rId23"/>
   </p:sldIdLst>
   <p:sldSz cx="9144000" cy="6858000" type="screen4x3"/>
   <p:notesSz cx="6858000" cy="9144000"/>
@@ -128,7 +127,7 @@
   </p:defaultTextStyle>
   <p:extLst>
     <p:ext uri="{EFAFB233-063F-42B5-8137-9DF3F51BA10A}">
-      <p15:sldGuideLst xmlns:p15="http://schemas.microsoft.com/office/powerpoint/2012/main" xmlns="">
+      <p15:sldGuideLst xmlns="" xmlns:p15="http://schemas.microsoft.com/office/powerpoint/2012/main">
         <p15:guide id="1" orient="horz" pos="2160">
           <p15:clr>
             <a:srgbClr val="A4A3A4"/>
@@ -4509,16 +4508,24 @@
               <a:t>in </a:t>
             </a:r>
             <a:r>
-              <a:rPr lang="de-DE"/>
+              <a:rPr lang="de-DE" dirty="0"/>
               <a:t>schlechter </a:t>
             </a:r>
             <a:r>
-              <a:rPr lang="de-DE" smtClean="0"/>
+              <a:rPr lang="de-DE" dirty="0" smtClean="0"/>
               <a:t>Hash, </a:t>
             </a:r>
             <a:r>
               <a:rPr lang="de-DE" dirty="0"/>
-              <a:t>der immer den selben Wert </a:t>
+              <a:t>der immer </a:t>
+            </a:r>
+            <a:r>
+              <a:rPr lang="de-DE" dirty="0" smtClean="0"/>
+              <a:t>denselben </a:t>
+            </a:r>
+            <a:r>
+              <a:rPr lang="de-DE" dirty="0"/>
+              <a:t>Wert </a:t>
             </a:r>
             <a:r>
               <a:rPr lang="de-DE" dirty="0" smtClean="0"/>
@@ -4677,11 +4684,6 @@
               </a:rPr>
               <a:t>Beschreibung…</a:t>
             </a:r>
-            <a:endParaRPr lang="de-DE" i="1" dirty="0" smtClean="0">
-              <a:solidFill>
-                <a:srgbClr val="FF0000"/>
-              </a:solidFill>
-            </a:endParaRPr>
           </a:p>
           <a:p>
             <a:pPr marL="0" indent="0">
@@ -4845,7 +4847,6 @@
               <a:rPr lang="de-DE" dirty="0" smtClean="0"/>
               <a:t> </a:t>
             </a:r>
-            <a:endParaRPr lang="de-DE" dirty="0" smtClean="0"/>
           </a:p>
           <a:p>
             <a:pPr marL="0" indent="0">
@@ -5095,6 +5096,90 @@
           </a:p>
         </p:txBody>
       </p:sp>
+      <p:sp>
+        <p:nvSpPr>
+          <p:cNvPr id="6" name="Pfeil nach rechts 5"/>
+          <p:cNvSpPr/>
+          <p:nvPr/>
+        </p:nvSpPr>
+        <p:spPr>
+          <a:xfrm rot="10800000">
+            <a:off x="3131840" y="3196094"/>
+            <a:ext cx="360040" cy="216024"/>
+          </a:xfrm>
+          <a:prstGeom prst="rightArrow">
+            <a:avLst/>
+          </a:prstGeom>
+        </p:spPr>
+        <p:style>
+          <a:lnRef idx="2">
+            <a:schemeClr val="accent5">
+              <a:shade val="50000"/>
+            </a:schemeClr>
+          </a:lnRef>
+          <a:fillRef idx="1">
+            <a:schemeClr val="accent5"/>
+          </a:fillRef>
+          <a:effectRef idx="0">
+            <a:schemeClr val="accent5"/>
+          </a:effectRef>
+          <a:fontRef idx="minor">
+            <a:schemeClr val="lt1"/>
+          </a:fontRef>
+        </p:style>
+        <p:txBody>
+          <a:bodyPr rtlCol="0" anchor="ctr"/>
+          <a:lstStyle/>
+          <a:p>
+            <a:pPr algn="ctr"/>
+            <a:endParaRPr lang="de-DE"/>
+          </a:p>
+        </p:txBody>
+      </p:sp>
+      <p:sp>
+        <p:nvSpPr>
+          <p:cNvPr id="7" name="Textfeld 6"/>
+          <p:cNvSpPr txBox="1"/>
+          <p:nvPr/>
+        </p:nvSpPr>
+        <p:spPr>
+          <a:xfrm>
+            <a:off x="3491880" y="3140968"/>
+            <a:ext cx="1152128" cy="276999"/>
+          </a:xfrm>
+          <a:prstGeom prst="rect">
+            <a:avLst/>
+          </a:prstGeom>
+          <a:noFill/>
+        </p:spPr>
+        <p:txBody>
+          <a:bodyPr wrap="square" rtlCol="0">
+            <a:spAutoFit/>
+          </a:bodyPr>
+          <a:lstStyle/>
+          <a:p>
+            <a:r>
+              <a:rPr lang="de-DE" sz="1200" b="1" dirty="0" smtClean="0">
+                <a:solidFill>
+                  <a:schemeClr val="tx2"/>
+                </a:solidFill>
+                <a:latin typeface="Verdana" panose="020B0604030504040204" pitchFamily="34" charset="0"/>
+                <a:ea typeface="Verdana" panose="020B0604030504040204" pitchFamily="34" charset="0"/>
+                <a:cs typeface="Verdana" panose="020B0604030504040204" pitchFamily="34" charset="0"/>
+              </a:rPr>
+              <a:t>Bzw. 64</a:t>
+            </a:r>
+            <a:endParaRPr lang="de-DE" sz="1200" b="1" dirty="0">
+              <a:solidFill>
+                <a:schemeClr val="tx2"/>
+              </a:solidFill>
+              <a:latin typeface="Verdana" panose="020B0604030504040204" pitchFamily="34" charset="0"/>
+              <a:ea typeface="Verdana" panose="020B0604030504040204" pitchFamily="34" charset="0"/>
+              <a:cs typeface="Verdana" panose="020B0604030504040204" pitchFamily="34" charset="0"/>
+            </a:endParaRPr>
+          </a:p>
+        </p:txBody>
+      </p:sp>
     </p:spTree>
     <p:extLst>
       <p:ext uri="{BB962C8B-B14F-4D97-AF65-F5344CB8AC3E}">
@@ -5160,48 +5245,51 @@
           <a:lstStyle/>
           <a:p>
             <a:r>
+              <a:rPr lang="de-DE" dirty="0" smtClean="0"/>
+              <a:t>Zugriffszeit – </a:t>
+            </a:r>
+            <a:r>
               <a:rPr lang="de-DE" dirty="0" err="1" smtClean="0"/>
-              <a:t>Hashes</a:t>
-            </a:r>
-            <a:r>
-              <a:rPr lang="de-DE" dirty="0" smtClean="0"/>
-              <a:t> </a:t>
-            </a:r>
-            <a:r>
-              <a:rPr lang="de-DE" dirty="0" smtClean="0"/>
-              <a:t>– Weitere…</a:t>
+              <a:t>AllWords</a:t>
             </a:r>
             <a:endParaRPr lang="de-DE" dirty="0"/>
           </a:p>
         </p:txBody>
       </p:sp>
-      <p:sp>
-        <p:nvSpPr>
-          <p:cNvPr id="3" name="Inhaltsplatzhalter 2"/>
-          <p:cNvSpPr>
-            <a:spLocks noGrp="1"/>
-          </p:cNvSpPr>
-          <p:nvPr>
-            <p:ph sz="quarter" idx="1"/>
-          </p:nvPr>
-        </p:nvSpPr>
-        <p:spPr/>
-        <p:txBody>
-          <a:bodyPr/>
-          <a:lstStyle/>
-          <a:p>
-            <a:r>
-              <a:rPr lang="de-DE" dirty="0" err="1" smtClean="0"/>
-              <a:t>Aaa</a:t>
-            </a:r>
-            <a:endParaRPr lang="de-DE" dirty="0"/>
-          </a:p>
-        </p:txBody>
-      </p:sp>
+      <p:pic>
+        <p:nvPicPr>
+          <p:cNvPr id="7" name="Grafik 6"/>
+          <p:cNvPicPr>
+            <a:picLocks noChangeAspect="1"/>
+          </p:cNvPicPr>
+          <p:nvPr/>
+        </p:nvPicPr>
+        <p:blipFill>
+          <a:blip r:embed="rId2">
+            <a:extLst>
+              <a:ext uri="{28A0092B-C50C-407E-A947-70E740481C1C}">
+                <a14:useLocalDpi xmlns:a14="http://schemas.microsoft.com/office/drawing/2010/main" val="0"/>
+              </a:ext>
+            </a:extLst>
+          </a:blip>
+          <a:stretch>
+            <a:fillRect/>
+          </a:stretch>
+        </p:blipFill>
+        <p:spPr>
+          <a:xfrm>
+            <a:off x="683568" y="1553467"/>
+            <a:ext cx="7745752" cy="4782769"/>
+          </a:xfrm>
+          <a:prstGeom prst="rect">
+            <a:avLst/>
+          </a:prstGeom>
+        </p:spPr>
+      </p:pic>
     </p:spTree>
     <p:extLst>
       <p:ext uri="{BB962C8B-B14F-4D97-AF65-F5344CB8AC3E}">
-        <p14:creationId xmlns:p14="http://schemas.microsoft.com/office/powerpoint/2010/main" val="438313895"/>
+        <p14:creationId xmlns:p14="http://schemas.microsoft.com/office/powerpoint/2010/main" val="11696346"/>
       </p:ext>
     </p:extLst>
   </p:cSld>
@@ -5264,11 +5352,11 @@
           <a:p>
             <a:r>
               <a:rPr lang="de-DE" dirty="0" smtClean="0"/>
-              <a:t>Ergebnisvergleich – </a:t>
+              <a:t>Zugriffszeit – </a:t>
             </a:r>
             <a:r>
               <a:rPr lang="de-DE" dirty="0" err="1" smtClean="0"/>
-              <a:t>AllWords</a:t>
+              <a:t>OnlyB</a:t>
             </a:r>
             <a:endParaRPr lang="de-DE" dirty="0"/>
           </a:p>
@@ -5297,7 +5385,7 @@
         <p:spPr>
           <a:xfrm>
             <a:off x="683568" y="1553467"/>
-            <a:ext cx="7745752" cy="4782769"/>
+            <a:ext cx="7745752" cy="4782768"/>
           </a:xfrm>
           <a:prstGeom prst="rect">
             <a:avLst/>
@@ -5307,7 +5395,7 @@
     </p:spTree>
     <p:extLst>
       <p:ext uri="{BB962C8B-B14F-4D97-AF65-F5344CB8AC3E}">
-        <p14:creationId xmlns:p14="http://schemas.microsoft.com/office/powerpoint/2010/main" val="11696346"/>
+        <p14:creationId xmlns:p14="http://schemas.microsoft.com/office/powerpoint/2010/main" val="4017706916"/>
       </p:ext>
     </p:extLst>
   </p:cSld>
@@ -5370,11 +5458,7 @@
           <a:p>
             <a:r>
               <a:rPr lang="de-DE" dirty="0" smtClean="0"/>
-              <a:t>Ergebnisvergleich – </a:t>
-            </a:r>
-            <a:r>
-              <a:rPr lang="de-DE" dirty="0" err="1" smtClean="0"/>
-              <a:t>OnlyB</a:t>
+              <a:t>Zugriffszeit – Links</a:t>
             </a:r>
             <a:endParaRPr lang="de-DE" dirty="0"/>
           </a:p>
@@ -5402,8 +5486,8 @@
         </p:blipFill>
         <p:spPr>
           <a:xfrm>
-            <a:off x="683568" y="1553467"/>
-            <a:ext cx="7745752" cy="4782768"/>
+            <a:off x="683569" y="1553467"/>
+            <a:ext cx="7745750" cy="4782768"/>
           </a:xfrm>
           <a:prstGeom prst="rect">
             <a:avLst/>
@@ -5413,7 +5497,7 @@
     </p:spTree>
     <p:extLst>
       <p:ext uri="{BB962C8B-B14F-4D97-AF65-F5344CB8AC3E}">
-        <p14:creationId xmlns:p14="http://schemas.microsoft.com/office/powerpoint/2010/main" val="4017706916"/>
+        <p14:creationId xmlns:p14="http://schemas.microsoft.com/office/powerpoint/2010/main" val="1618479626"/>
       </p:ext>
     </p:extLst>
   </p:cSld>
@@ -5475,8 +5559,12 @@
           <a:lstStyle/>
           <a:p>
             <a:r>
+              <a:rPr lang="de-DE" dirty="0"/>
+              <a:t>Zugriffszeit </a:t>
+            </a:r>
+            <a:r>
               <a:rPr lang="de-DE" dirty="0" smtClean="0"/>
-              <a:t>Ergebnisvergleich – Links</a:t>
+              <a:t>- Gesamt</a:t>
             </a:r>
             <a:endParaRPr lang="de-DE" dirty="0"/>
           </a:p>
@@ -5504,18 +5592,113 @@
         </p:blipFill>
         <p:spPr>
           <a:xfrm>
-            <a:off x="683569" y="1553467"/>
-            <a:ext cx="7745750" cy="4782768"/>
+            <a:off x="683568" y="1553467"/>
+            <a:ext cx="7745753" cy="4782769"/>
           </a:xfrm>
           <a:prstGeom prst="rect">
             <a:avLst/>
           </a:prstGeom>
         </p:spPr>
       </p:pic>
+      <p:sp>
+        <p:nvSpPr>
+          <p:cNvPr id="4" name="Textfeld 3"/>
+          <p:cNvSpPr txBox="1"/>
+          <p:nvPr/>
+        </p:nvSpPr>
+        <p:spPr>
+          <a:xfrm>
+            <a:off x="683568" y="6372036"/>
+            <a:ext cx="5688632" cy="369332"/>
+          </a:xfrm>
+          <a:prstGeom prst="rect">
+            <a:avLst/>
+          </a:prstGeom>
+          <a:noFill/>
+        </p:spPr>
+        <p:txBody>
+          <a:bodyPr wrap="square" rtlCol="0">
+            <a:spAutoFit/>
+          </a:bodyPr>
+          <a:lstStyle/>
+          <a:p>
+            <a:r>
+              <a:rPr lang="de-DE" b="1" dirty="0" smtClean="0">
+                <a:solidFill>
+                  <a:schemeClr val="accent2">
+                    <a:lumMod val="75000"/>
+                  </a:schemeClr>
+                </a:solidFill>
+              </a:rPr>
+              <a:t>Blau = </a:t>
+            </a:r>
+            <a:r>
+              <a:rPr lang="de-DE" b="1" dirty="0" err="1" smtClean="0">
+                <a:solidFill>
+                  <a:schemeClr val="accent2">
+                    <a:lumMod val="75000"/>
+                  </a:schemeClr>
+                </a:solidFill>
+              </a:rPr>
+              <a:t>AllWords</a:t>
+            </a:r>
+            <a:r>
+              <a:rPr lang="de-DE" b="1" dirty="0" smtClean="0">
+                <a:solidFill>
+                  <a:schemeClr val="accent2">
+                    <a:lumMod val="75000"/>
+                  </a:schemeClr>
+                </a:solidFill>
+              </a:rPr>
+              <a:t> </a:t>
+            </a:r>
+            <a:r>
+              <a:rPr lang="de-DE" b="1" dirty="0" smtClean="0"/>
+              <a:t>| </a:t>
+            </a:r>
+            <a:r>
+              <a:rPr lang="de-DE" b="1" dirty="0" smtClean="0">
+                <a:solidFill>
+                  <a:schemeClr val="accent3"/>
+                </a:solidFill>
+              </a:rPr>
+              <a:t>Rot = </a:t>
+            </a:r>
+            <a:r>
+              <a:rPr lang="de-DE" b="1" dirty="0" err="1" smtClean="0">
+                <a:solidFill>
+                  <a:schemeClr val="accent3"/>
+                </a:solidFill>
+              </a:rPr>
+              <a:t>OnlyB</a:t>
+            </a:r>
+            <a:r>
+              <a:rPr lang="de-DE" b="1" dirty="0" smtClean="0">
+                <a:solidFill>
+                  <a:schemeClr val="accent3"/>
+                </a:solidFill>
+              </a:rPr>
+              <a:t> </a:t>
+            </a:r>
+            <a:r>
+              <a:rPr lang="de-DE" b="1" dirty="0" smtClean="0"/>
+              <a:t>| </a:t>
+            </a:r>
+            <a:r>
+              <a:rPr lang="de-DE" b="1" dirty="0">
+                <a:solidFill>
+                  <a:srgbClr val="008000"/>
+                </a:solidFill>
+              </a:rPr>
+              <a:t>Grün = Links </a:t>
+            </a:r>
+          </a:p>
+        </p:txBody>
+      </p:sp>
     </p:spTree>
     <p:extLst>
       <p:ext uri="{BB962C8B-B14F-4D97-AF65-F5344CB8AC3E}">
-        <p14:creationId xmlns:p14="http://schemas.microsoft.com/office/powerpoint/2010/main" val="1618479626"/>
+        <p14:creationId xmlns:p14="http://schemas.microsoft.com/office/powerpoint/2010/main" val="4195434468"/>
       </p:ext>
     </p:extLst>
   </p:cSld>
@@ -5578,7 +5761,30 @@
           <a:p>
             <a:r>
               <a:rPr lang="de-DE" dirty="0" smtClean="0"/>
-              <a:t>Ergebnisvergleich - Gesamt</a:t>
+              <a:t>Kollisionen</a:t>
+            </a:r>
+            <a:endParaRPr lang="de-DE" dirty="0"/>
+          </a:p>
+        </p:txBody>
+      </p:sp>
+      <p:sp>
+        <p:nvSpPr>
+          <p:cNvPr id="3" name="Inhaltsplatzhalter 2"/>
+          <p:cNvSpPr>
+            <a:spLocks noGrp="1"/>
+          </p:cNvSpPr>
+          <p:nvPr>
+            <p:ph sz="quarter" idx="1"/>
+          </p:nvPr>
+        </p:nvSpPr>
+        <p:spPr/>
+        <p:txBody>
+          <a:bodyPr/>
+          <a:lstStyle/>
+          <a:p>
+            <a:r>
+              <a:rPr lang="de-DE" dirty="0" smtClean="0"/>
+              <a:t>&lt;folgt&gt; Bin ich gerade dran</a:t>
             </a:r>
             <a:endParaRPr lang="de-DE" dirty="0"/>
           </a:p>
@@ -5586,7 +5792,7 @@
       </p:sp>
       <p:pic>
         <p:nvPicPr>
-          <p:cNvPr id="7" name="Grafik 6"/>
+          <p:cNvPr id="4" name="Grafik 3"/>
           <p:cNvPicPr>
             <a:picLocks noChangeAspect="1"/>
           </p:cNvPicPr>
@@ -5606,8 +5812,8 @@
         </p:blipFill>
         <p:spPr>
           <a:xfrm>
-            <a:off x="683568" y="1553467"/>
-            <a:ext cx="7745753" cy="4782769"/>
+            <a:off x="475316" y="1647358"/>
+            <a:ext cx="8193367" cy="4661962"/>
           </a:xfrm>
           <a:prstGeom prst="rect">
             <a:avLst/>
@@ -5616,7 +5822,7 @@
       </p:pic>
       <p:sp>
         <p:nvSpPr>
-          <p:cNvPr id="4" name="Textfeld 3"/>
+          <p:cNvPr id="6" name="Textfeld 5"/>
           <p:cNvSpPr txBox="1"/>
           <p:nvPr/>
         </p:nvSpPr>
@@ -5701,23 +5907,18 @@
             <a:r>
               <a:rPr lang="de-DE" b="1" dirty="0">
                 <a:solidFill>
-                  <a:srgbClr val="00B050"/>
+                  <a:srgbClr val="008000"/>
                 </a:solidFill>
               </a:rPr>
               <a:t>Grün = Links </a:t>
             </a:r>
-            <a:endParaRPr lang="de-DE" b="1" dirty="0">
-              <a:solidFill>
-                <a:schemeClr val="accent3"/>
-              </a:solidFill>
-            </a:endParaRPr>
           </a:p>
         </p:txBody>
       </p:sp>
     </p:spTree>
     <p:extLst>
       <p:ext uri="{BB962C8B-B14F-4D97-AF65-F5344CB8AC3E}">
-        <p14:creationId xmlns:p14="http://schemas.microsoft.com/office/powerpoint/2010/main" val="4195434468"/>
+        <p14:creationId xmlns:p14="http://schemas.microsoft.com/office/powerpoint/2010/main" val="1069646733"/>
       </p:ext>
     </p:extLst>
   </p:cSld>
@@ -5780,352 +5981,6 @@
           <a:p>
             <a:r>
               <a:rPr lang="de-DE" dirty="0" smtClean="0"/>
-              <a:t>Kollisionen</a:t>
-            </a:r>
-            <a:endParaRPr lang="de-DE" dirty="0"/>
-          </a:p>
-        </p:txBody>
-      </p:sp>
-      <p:sp>
-        <p:nvSpPr>
-          <p:cNvPr id="7" name="Textfeld 6"/>
-          <p:cNvSpPr txBox="1"/>
-          <p:nvPr/>
-        </p:nvSpPr>
-        <p:spPr>
-          <a:xfrm>
-            <a:off x="493304" y="6021288"/>
-            <a:ext cx="8064896" cy="646331"/>
-          </a:xfrm>
-          <a:prstGeom prst="rect">
-            <a:avLst/>
-          </a:prstGeom>
-          <a:noFill/>
-        </p:spPr>
-        <p:txBody>
-          <a:bodyPr wrap="square" rtlCol="0">
-            <a:spAutoFit/>
-          </a:bodyPr>
-          <a:lstStyle/>
-          <a:p>
-            <a:r>
-              <a:rPr lang="de-DE" dirty="0" smtClean="0"/>
-              <a:t>CPU</a:t>
-            </a:r>
-            <a:r>
-              <a:rPr lang="de-DE" dirty="0"/>
-              <a:t>: Intel Core i5-3450 </a:t>
-            </a:r>
-            <a:r>
-              <a:rPr lang="de-DE" dirty="0" err="1"/>
-              <a:t>Quadcore</a:t>
-            </a:r>
-            <a:r>
-              <a:rPr lang="de-DE" dirty="0"/>
-              <a:t> @ 3.10 </a:t>
-            </a:r>
-            <a:r>
-              <a:rPr lang="de-DE" dirty="0" smtClean="0"/>
-              <a:t>GHz; RAM</a:t>
-            </a:r>
-            <a:r>
-              <a:rPr lang="de-DE" dirty="0"/>
-              <a:t>: 16 </a:t>
-            </a:r>
-            <a:r>
-              <a:rPr lang="de-DE" dirty="0" smtClean="0"/>
-              <a:t>GB</a:t>
-            </a:r>
-          </a:p>
-          <a:p>
-            <a:r>
-              <a:rPr lang="de-DE" dirty="0" smtClean="0"/>
-              <a:t>Windows 10; Microsoft </a:t>
-            </a:r>
-            <a:r>
-              <a:rPr lang="de-DE" dirty="0"/>
-              <a:t>Visual Studio - Kompiliert auf </a:t>
-            </a:r>
-            <a:r>
-              <a:rPr lang="de-DE" dirty="0" smtClean="0"/>
-              <a:t>Release </a:t>
-            </a:r>
-            <a:r>
-              <a:rPr lang="de-DE" dirty="0"/>
-              <a:t>x64</a:t>
-            </a:r>
-          </a:p>
-        </p:txBody>
-      </p:sp>
-      <p:sp>
-        <p:nvSpPr>
-          <p:cNvPr id="3" name="Inhaltsplatzhalter 2"/>
-          <p:cNvSpPr>
-            <a:spLocks noGrp="1"/>
-          </p:cNvSpPr>
-          <p:nvPr>
-            <p:ph sz="quarter" idx="1"/>
-          </p:nvPr>
-        </p:nvSpPr>
-        <p:spPr/>
-        <p:txBody>
-          <a:bodyPr/>
-          <a:lstStyle/>
-          <a:p>
-            <a:r>
-              <a:rPr lang="de-DE" dirty="0" smtClean="0"/>
-              <a:t>&lt;folgt&gt; Bin ich gerade dran</a:t>
-            </a:r>
-            <a:endParaRPr lang="de-DE" dirty="0"/>
-          </a:p>
-        </p:txBody>
-      </p:sp>
-    </p:spTree>
-    <p:extLst>
-      <p:ext uri="{BB962C8B-B14F-4D97-AF65-F5344CB8AC3E}">
-        <p14:creationId xmlns:p14="http://schemas.microsoft.com/office/powerpoint/2010/main" val="1069646733"/>
-      </p:ext>
-    </p:extLst>
-  </p:cSld>
-  <p:clrMapOvr>
-    <a:masterClrMapping/>
-  </p:clrMapOvr>
-  <mc:AlternateContent xmlns:mc="http://schemas.openxmlformats.org/markup-compatibility/2006" xmlns:p14="http://schemas.microsoft.com/office/powerpoint/2010/main">
-    <mc:Choice Requires="p14">
-      <p:transition p14:dur="300">
-        <p:fade/>
-      </p:transition>
-    </mc:Choice>
-    <mc:Fallback xmlns="">
-      <p:transition>
-        <p:fade/>
-      </p:transition>
-    </mc:Fallback>
-  </mc:AlternateContent>
-  <p:timing>
-    <p:tnLst>
-      <p:par>
-        <p:cTn id="1" dur="indefinite" restart="never" nodeType="tmRoot"/>
-      </p:par>
-    </p:tnLst>
-  </p:timing>
-</p:sld>
-</file>
-
-<file path=ppt/slides/slide2.xml><?xml version="1.0" encoding="utf-8"?>
-<p:sld xmlns:a="http://schemas.openxmlformats.org/drawingml/2006/main" xmlns:r="http://schemas.openxmlformats.org/officeDocument/2006/relationships" xmlns:p="http://schemas.openxmlformats.org/presentationml/2006/main">
-  <p:cSld>
-    <p:spTree>
-      <p:nvGrpSpPr>
-        <p:cNvPr id="1" name=""/>
-        <p:cNvGrpSpPr/>
-        <p:nvPr/>
-      </p:nvGrpSpPr>
-      <p:grpSpPr>
-        <a:xfrm>
-          <a:off x="0" y="0"/>
-          <a:ext cx="0" cy="0"/>
-          <a:chOff x="0" y="0"/>
-          <a:chExt cx="0" cy="0"/>
-        </a:xfrm>
-      </p:grpSpPr>
-      <p:sp>
-        <p:nvSpPr>
-          <p:cNvPr id="2" name="Titel 1"/>
-          <p:cNvSpPr>
-            <a:spLocks noGrp="1"/>
-          </p:cNvSpPr>
-          <p:nvPr>
-            <p:ph type="ctrTitle"/>
-          </p:nvPr>
-        </p:nvSpPr>
-        <p:spPr>
-          <a:xfrm>
-            <a:off x="971600" y="1052736"/>
-            <a:ext cx="7344816" cy="1834447"/>
-          </a:xfrm>
-        </p:spPr>
-        <p:txBody>
-          <a:bodyPr>
-            <a:normAutofit fontScale="90000"/>
-          </a:bodyPr>
-          <a:lstStyle/>
-          <a:p>
-            <a:pPr algn="ctr"/>
-            <a:r>
-              <a:rPr lang="de-DE" sz="6000" b="0" dirty="0" smtClean="0">
-                <a:latin typeface="Segoe UI" panose="020B0502040204020203" pitchFamily="34" charset="0"/>
-                <a:cs typeface="Segoe UI" panose="020B0502040204020203" pitchFamily="34" charset="0"/>
-              </a:rPr>
-              <a:t>Effizienz nichtkryptographischer Hashverfahren</a:t>
-            </a:r>
-            <a:endParaRPr lang="de-DE" sz="6000" b="0" dirty="0">
-              <a:latin typeface="Segoe UI" panose="020B0502040204020203" pitchFamily="34" charset="0"/>
-              <a:cs typeface="Segoe UI" panose="020B0502040204020203" pitchFamily="34" charset="0"/>
-            </a:endParaRPr>
-          </a:p>
-        </p:txBody>
-      </p:sp>
-      <p:sp>
-        <p:nvSpPr>
-          <p:cNvPr id="3" name="Untertitel 2"/>
-          <p:cNvSpPr>
-            <a:spLocks noGrp="1"/>
-          </p:cNvSpPr>
-          <p:nvPr>
-            <p:ph type="subTitle" idx="1"/>
-          </p:nvPr>
-        </p:nvSpPr>
-        <p:spPr>
-          <a:xfrm>
-            <a:off x="395536" y="5974432"/>
-            <a:ext cx="8280920" cy="694928"/>
-          </a:xfrm>
-        </p:spPr>
-        <p:txBody>
-          <a:bodyPr>
-            <a:normAutofit lnSpcReduction="10000"/>
-          </a:bodyPr>
-          <a:lstStyle/>
-          <a:p>
-            <a:r>
-              <a:rPr lang="de-DE" sz="1800" b="0" dirty="0" smtClean="0">
-                <a:latin typeface="Segoe UI" panose="020B0502040204020203" pitchFamily="34" charset="0"/>
-                <a:cs typeface="Segoe UI" panose="020B0502040204020203" pitchFamily="34" charset="0"/>
-              </a:rPr>
-              <a:t>von</a:t>
-            </a:r>
-          </a:p>
-          <a:p>
-            <a:r>
-              <a:rPr lang="de-DE" sz="1800" b="0" dirty="0" smtClean="0">
-                <a:latin typeface="Segoe UI" panose="020B0502040204020203" pitchFamily="34" charset="0"/>
-                <a:cs typeface="Segoe UI" panose="020B0502040204020203" pitchFamily="34" charset="0"/>
-              </a:rPr>
-              <a:t>Ivan Kalinin, Christopher </a:t>
-            </a:r>
-            <a:r>
-              <a:rPr lang="de-DE" b="0" dirty="0"/>
-              <a:t>Sann, Niklas </a:t>
-            </a:r>
-            <a:r>
-              <a:rPr lang="de-DE" b="0" dirty="0" err="1"/>
-              <a:t>Warmuth</a:t>
-            </a:r>
-            <a:endParaRPr lang="de-DE" sz="1800" b="0" dirty="0">
-              <a:latin typeface="Segoe UI" panose="020B0502040204020203" pitchFamily="34" charset="0"/>
-              <a:cs typeface="Segoe UI" panose="020B0502040204020203" pitchFamily="34" charset="0"/>
-            </a:endParaRPr>
-          </a:p>
-        </p:txBody>
-      </p:sp>
-      <p:pic>
-        <p:nvPicPr>
-          <p:cNvPr id="4" name="Picture 2" descr="Bildergebnis für non cryptographic hash"/>
-          <p:cNvPicPr>
-            <a:picLocks noChangeAspect="1" noChangeArrowheads="1"/>
-          </p:cNvPicPr>
-          <p:nvPr/>
-        </p:nvPicPr>
-        <p:blipFill>
-          <a:blip r:embed="rId2" cstate="print">
-            <a:extLst>
-              <a:ext uri="{28A0092B-C50C-407E-A947-70E740481C1C}">
-                <a14:useLocalDpi xmlns:a14="http://schemas.microsoft.com/office/drawing/2010/main" val="0"/>
-              </a:ext>
-            </a:extLst>
-          </a:blip>
-          <a:srcRect/>
-          <a:stretch>
-            <a:fillRect/>
-          </a:stretch>
-        </p:blipFill>
-        <p:spPr bwMode="auto">
-          <a:xfrm>
-            <a:off x="2771800" y="2996952"/>
-            <a:ext cx="3950105" cy="3027834"/>
-          </a:xfrm>
-          <a:prstGeom prst="rect">
-            <a:avLst/>
-          </a:prstGeom>
-          <a:noFill/>
-          <a:extLst>
-            <a:ext uri="{909E8E84-426E-40DD-AFC4-6F175D3DCCD1}">
-              <a14:hiddenFill xmlns:a14="http://schemas.microsoft.com/office/drawing/2010/main">
-                <a:solidFill>
-                  <a:srgbClr val="FFFFFF"/>
-                </a:solidFill>
-              </a14:hiddenFill>
-            </a:ext>
-          </a:extLst>
-        </p:spPr>
-      </p:pic>
-    </p:spTree>
-    <p:extLst>
-      <p:ext uri="{BB962C8B-B14F-4D97-AF65-F5344CB8AC3E}">
-        <p14:creationId xmlns:p14="http://schemas.microsoft.com/office/powerpoint/2010/main" val="149756663"/>
-      </p:ext>
-    </p:extLst>
-  </p:cSld>
-  <p:clrMapOvr>
-    <a:masterClrMapping/>
-  </p:clrMapOvr>
-  <mc:AlternateContent xmlns:mc="http://schemas.openxmlformats.org/markup-compatibility/2006" xmlns:p14="http://schemas.microsoft.com/office/powerpoint/2010/main">
-    <mc:Choice Requires="p14">
-      <p:transition p14:dur="300">
-        <p:fade/>
-      </p:transition>
-    </mc:Choice>
-    <mc:Fallback xmlns="">
-      <p:transition>
-        <p:fade/>
-      </p:transition>
-    </mc:Fallback>
-  </mc:AlternateContent>
-  <p:timing>
-    <p:tnLst>
-      <p:par>
-        <p:cTn id="1" dur="indefinite" restart="never" nodeType="tmRoot"/>
-      </p:par>
-    </p:tnLst>
-  </p:timing>
-</p:sld>
-</file>
-
-<file path=ppt/slides/slide20.xml><?xml version="1.0" encoding="utf-8"?>
-<p:sld xmlns:a="http://schemas.openxmlformats.org/drawingml/2006/main" xmlns:r="http://schemas.openxmlformats.org/officeDocument/2006/relationships" xmlns:p="http://schemas.openxmlformats.org/presentationml/2006/main">
-  <p:cSld>
-    <p:spTree>
-      <p:nvGrpSpPr>
-        <p:cNvPr id="1" name=""/>
-        <p:cNvGrpSpPr/>
-        <p:nvPr/>
-      </p:nvGrpSpPr>
-      <p:grpSpPr>
-        <a:xfrm>
-          <a:off x="0" y="0"/>
-          <a:ext cx="0" cy="0"/>
-          <a:chOff x="0" y="0"/>
-          <a:chExt cx="0" cy="0"/>
-        </a:xfrm>
-      </p:grpSpPr>
-      <p:sp>
-        <p:nvSpPr>
-          <p:cNvPr id="2" name="Titel 1"/>
-          <p:cNvSpPr>
-            <a:spLocks noGrp="1"/>
-          </p:cNvSpPr>
-          <p:nvPr>
-            <p:ph type="title"/>
-          </p:nvPr>
-        </p:nvSpPr>
-        <p:spPr/>
-        <p:txBody>
-          <a:bodyPr/>
-          <a:lstStyle/>
-          <a:p>
-            <a:r>
-              <a:rPr lang="de-DE" dirty="0" smtClean="0"/>
               <a:t>Fazit</a:t>
             </a:r>
             <a:endParaRPr lang="de-DE" dirty="0"/>
@@ -6215,6 +6070,48 @@
                 </a:solidFill>
               </a:rPr>
               <a:t>Weiteres…</a:t>
+            </a:r>
+          </a:p>
+        </p:txBody>
+      </p:sp>
+      <p:sp>
+        <p:nvSpPr>
+          <p:cNvPr id="4" name="Rechteck 3"/>
+          <p:cNvSpPr/>
+          <p:nvPr/>
+        </p:nvSpPr>
+        <p:spPr>
+          <a:xfrm>
+            <a:off x="236712" y="6093296"/>
+            <a:ext cx="8640960" cy="646331"/>
+          </a:xfrm>
+          <a:prstGeom prst="rect">
+            <a:avLst/>
+          </a:prstGeom>
+        </p:spPr>
+        <p:txBody>
+          <a:bodyPr wrap="square">
+            <a:spAutoFit/>
+          </a:bodyPr>
+          <a:lstStyle/>
+          <a:p>
+            <a:r>
+              <a:rPr lang="de-DE" dirty="0"/>
+              <a:t>CPU: Intel Core i5-3450 </a:t>
+            </a:r>
+            <a:r>
+              <a:rPr lang="de-DE" dirty="0" err="1"/>
+              <a:t>Quadcore</a:t>
+            </a:r>
+            <a:r>
+              <a:rPr lang="de-DE" dirty="0"/>
+              <a:t> @ 3.10 GHz; RAM: 16 GB</a:t>
+            </a:r>
+          </a:p>
+          <a:p>
+            <a:r>
+              <a:rPr lang="de-DE" dirty="0"/>
+              <a:t>Windows 10; Microsoft Visual Studio - Kompiliert auf Release x64</a:t>
             </a:r>
           </a:p>
         </p:txBody>
@@ -6457,7 +6354,187 @@
 </p:sld>
 </file>
 
-<file path=ppt/slides/slide21.xml><?xml version="1.0" encoding="utf-8"?>
+<file path=ppt/slides/slide2.xml><?xml version="1.0" encoding="utf-8"?>
+<p:sld xmlns:a="http://schemas.openxmlformats.org/drawingml/2006/main" xmlns:r="http://schemas.openxmlformats.org/officeDocument/2006/relationships" xmlns:p="http://schemas.openxmlformats.org/presentationml/2006/main">
+  <p:cSld>
+    <p:spTree>
+      <p:nvGrpSpPr>
+        <p:cNvPr id="1" name=""/>
+        <p:cNvGrpSpPr/>
+        <p:nvPr/>
+      </p:nvGrpSpPr>
+      <p:grpSpPr>
+        <a:xfrm>
+          <a:off x="0" y="0"/>
+          <a:ext cx="0" cy="0"/>
+          <a:chOff x="0" y="0"/>
+          <a:chExt cx="0" cy="0"/>
+        </a:xfrm>
+      </p:grpSpPr>
+      <p:sp>
+        <p:nvSpPr>
+          <p:cNvPr id="2" name="Titel 1"/>
+          <p:cNvSpPr>
+            <a:spLocks noGrp="1"/>
+          </p:cNvSpPr>
+          <p:nvPr>
+            <p:ph type="ctrTitle"/>
+          </p:nvPr>
+        </p:nvSpPr>
+        <p:spPr>
+          <a:xfrm>
+            <a:off x="971600" y="1052736"/>
+            <a:ext cx="7344816" cy="1834447"/>
+          </a:xfrm>
+        </p:spPr>
+        <p:txBody>
+          <a:bodyPr>
+            <a:normAutofit fontScale="90000"/>
+          </a:bodyPr>
+          <a:lstStyle/>
+          <a:p>
+            <a:pPr algn="ctr"/>
+            <a:r>
+              <a:rPr lang="de-DE" sz="6000" b="0" dirty="0" smtClean="0">
+                <a:latin typeface="Segoe UI" panose="020B0502040204020203" pitchFamily="34" charset="0"/>
+                <a:cs typeface="Segoe UI" panose="020B0502040204020203" pitchFamily="34" charset="0"/>
+              </a:rPr>
+              <a:t>Effizienz nichtkryptographischer Hashverfahren</a:t>
+            </a:r>
+            <a:endParaRPr lang="de-DE" sz="6000" b="0" dirty="0">
+              <a:latin typeface="Segoe UI" panose="020B0502040204020203" pitchFamily="34" charset="0"/>
+              <a:cs typeface="Segoe UI" panose="020B0502040204020203" pitchFamily="34" charset="0"/>
+            </a:endParaRPr>
+          </a:p>
+        </p:txBody>
+      </p:sp>
+      <p:sp>
+        <p:nvSpPr>
+          <p:cNvPr id="3" name="Untertitel 2"/>
+          <p:cNvSpPr>
+            <a:spLocks noGrp="1"/>
+          </p:cNvSpPr>
+          <p:nvPr>
+            <p:ph type="subTitle" idx="1"/>
+          </p:nvPr>
+        </p:nvSpPr>
+        <p:spPr>
+          <a:xfrm>
+            <a:off x="395536" y="5974432"/>
+            <a:ext cx="8280920" cy="694928"/>
+          </a:xfrm>
+        </p:spPr>
+        <p:txBody>
+          <a:bodyPr>
+            <a:normAutofit lnSpcReduction="10000"/>
+          </a:bodyPr>
+          <a:lstStyle/>
+          <a:p>
+            <a:r>
+              <a:rPr lang="de-DE" sz="1800" b="0" dirty="0" smtClean="0">
+                <a:latin typeface="Segoe UI" panose="020B0502040204020203" pitchFamily="34" charset="0"/>
+                <a:cs typeface="Segoe UI" panose="020B0502040204020203" pitchFamily="34" charset="0"/>
+              </a:rPr>
+              <a:t>von</a:t>
+            </a:r>
+          </a:p>
+          <a:p>
+            <a:r>
+              <a:rPr lang="de-DE" sz="1800" b="0" dirty="0" smtClean="0">
+                <a:latin typeface="Segoe UI" panose="020B0502040204020203" pitchFamily="34" charset="0"/>
+                <a:cs typeface="Segoe UI" panose="020B0502040204020203" pitchFamily="34" charset="0"/>
+              </a:rPr>
+              <a:t>Ivan Kalinin, Christopher </a:t>
+            </a:r>
+            <a:r>
+              <a:rPr lang="de-DE" b="0" dirty="0"/>
+              <a:t>Sann, Niklas </a:t>
+            </a:r>
+            <a:r>
+              <a:rPr lang="de-DE" b="0" dirty="0" err="1"/>
+              <a:t>Warmuth</a:t>
+            </a:r>
+            <a:endParaRPr lang="de-DE" sz="1800" b="0" dirty="0">
+              <a:latin typeface="Segoe UI" panose="020B0502040204020203" pitchFamily="34" charset="0"/>
+              <a:cs typeface="Segoe UI" panose="020B0502040204020203" pitchFamily="34" charset="0"/>
+            </a:endParaRPr>
+          </a:p>
+        </p:txBody>
+      </p:sp>
+      <p:pic>
+        <p:nvPicPr>
+          <p:cNvPr id="4" name="Picture 2" descr="Bildergebnis für non cryptographic hash"/>
+          <p:cNvPicPr>
+            <a:picLocks noChangeAspect="1" noChangeArrowheads="1"/>
+          </p:cNvPicPr>
+          <p:nvPr/>
+        </p:nvPicPr>
+        <p:blipFill>
+          <a:blip r:embed="rId2" cstate="print">
+            <a:extLst>
+              <a:ext uri="{28A0092B-C50C-407E-A947-70E740481C1C}">
+                <a14:useLocalDpi xmlns:a14="http://schemas.microsoft.com/office/drawing/2010/main" val="0"/>
+              </a:ext>
+            </a:extLst>
+          </a:blip>
+          <a:srcRect/>
+          <a:stretch>
+            <a:fillRect/>
+          </a:stretch>
+        </p:blipFill>
+        <p:spPr bwMode="auto">
+          <a:xfrm>
+            <a:off x="2771800" y="2996952"/>
+            <a:ext cx="3950105" cy="3027834"/>
+          </a:xfrm>
+          <a:prstGeom prst="rect">
+            <a:avLst/>
+          </a:prstGeom>
+          <a:noFill/>
+          <a:extLst>
+            <a:ext uri="{909E8E84-426E-40DD-AFC4-6F175D3DCCD1}">
+              <a14:hiddenFill xmlns:a14="http://schemas.microsoft.com/office/drawing/2010/main">
+                <a:solidFill>
+                  <a:srgbClr val="FFFFFF"/>
+                </a:solidFill>
+              </a14:hiddenFill>
+            </a:ext>
+          </a:extLst>
+        </p:spPr>
+      </p:pic>
+    </p:spTree>
+    <p:extLst>
+      <p:ext uri="{BB962C8B-B14F-4D97-AF65-F5344CB8AC3E}">
+        <p14:creationId xmlns:p14="http://schemas.microsoft.com/office/powerpoint/2010/main" val="149756663"/>
+      </p:ext>
+    </p:extLst>
+  </p:cSld>
+  <p:clrMapOvr>
+    <a:masterClrMapping/>
+  </p:clrMapOvr>
+  <mc:AlternateContent xmlns:mc="http://schemas.openxmlformats.org/markup-compatibility/2006" xmlns:p14="http://schemas.microsoft.com/office/powerpoint/2010/main">
+    <mc:Choice Requires="p14">
+      <p:transition p14:dur="300">
+        <p:fade/>
+      </p:transition>
+    </mc:Choice>
+    <mc:Fallback xmlns="">
+      <p:transition>
+        <p:fade/>
+      </p:transition>
+    </mc:Fallback>
+  </mc:AlternateContent>
+  <p:timing>
+    <p:tnLst>
+      <p:par>
+        <p:cTn id="1" dur="indefinite" restart="never" nodeType="tmRoot"/>
+      </p:par>
+    </p:tnLst>
+  </p:timing>
+</p:sld>
+</file>
+
+<file path=ppt/slides/slide20.xml><?xml version="1.0" encoding="utf-8"?>
 <p:sld xmlns:a="http://schemas.openxmlformats.org/drawingml/2006/main" xmlns:r="http://schemas.openxmlformats.org/officeDocument/2006/relationships" xmlns:p="http://schemas.openxmlformats.org/presentationml/2006/main">
   <p:cSld>
     <p:spTree>
@@ -6741,7 +6818,7 @@
 </p:sld>
 </file>
 
-<file path=ppt/slides/slide22.xml><?xml version="1.0" encoding="utf-8"?>
+<file path=ppt/slides/slide21.xml><?xml version="1.0" encoding="utf-8"?>
 <p:sld xmlns:a="http://schemas.openxmlformats.org/drawingml/2006/main" xmlns:r="http://schemas.openxmlformats.org/officeDocument/2006/relationships" xmlns:p="http://schemas.openxmlformats.org/presentationml/2006/main">
   <p:cSld>
     <p:spTree>
@@ -6855,7 +6932,7 @@
 </p:sld>
 </file>
 
-<file path=ppt/slides/slide23.xml><?xml version="1.0" encoding="utf-8"?>
+<file path=ppt/slides/slide22.xml><?xml version="1.0" encoding="utf-8"?>
 <p:sld xmlns:a="http://schemas.openxmlformats.org/drawingml/2006/main" xmlns:r="http://schemas.openxmlformats.org/officeDocument/2006/relationships" xmlns:p="http://schemas.openxmlformats.org/presentationml/2006/main">
   <p:cSld>
     <p:spTree>
@@ -7010,22 +7087,23 @@
           </a:p>
           <a:p>
             <a:r>
-              <a:rPr lang="de-DE" dirty="0" err="1" smtClean="0"/>
-              <a:t>Hashes</a:t>
+              <a:rPr lang="de-DE" dirty="0" smtClean="0"/>
+              <a:t>Vorstellung einzelner Hashverfahren</a:t>
+            </a:r>
+          </a:p>
+          <a:p>
+            <a:r>
+              <a:rPr lang="de-DE" dirty="0"/>
+              <a:t>Zugriffszeit</a:t>
             </a:r>
             <a:endParaRPr lang="de-DE" dirty="0" smtClean="0"/>
           </a:p>
           <a:p>
             <a:r>
               <a:rPr lang="de-DE" dirty="0" smtClean="0"/>
-              <a:t>Ergebnisvergleich</a:t>
-            </a:r>
-          </a:p>
-          <a:p>
-            <a:r>
-              <a:rPr lang="de-DE" dirty="0" smtClean="0"/>
-              <a:t>Zusammenfassung</a:t>
-            </a:r>
+              <a:t>Kollisionen</a:t>
+            </a:r>
+            <a:endParaRPr lang="de-DE" dirty="0"/>
           </a:p>
           <a:p>
             <a:r>
@@ -7272,37 +7350,44 @@
           <a:p>
             <a:r>
               <a:rPr lang="de-DE" dirty="0" smtClean="0"/>
-              <a:t>Quellinformationen </a:t>
-            </a:r>
-            <a:r>
-              <a:rPr lang="de-DE" dirty="0"/>
-              <a:t>in </a:t>
-            </a:r>
+              <a:t>Betrachtung drei verschiedener Datensätze</a:t>
+            </a:r>
+          </a:p>
+          <a:p>
+            <a:pPr lvl="1"/>
             <a:r>
               <a:rPr lang="de-DE" dirty="0" smtClean="0"/>
-              <a:t>Listenform</a:t>
-            </a:r>
+              <a:t>Deutsches Lexikon (113.439 Zeilen</a:t>
+            </a:r>
+            <a:r>
+              <a:rPr lang="de-DE" dirty="0" smtClean="0"/>
+              <a:t>)	1407 kB</a:t>
+            </a:r>
+            <a:endParaRPr lang="de-DE" dirty="0" smtClean="0"/>
           </a:p>
           <a:p>
             <a:pPr lvl="1"/>
             <a:r>
               <a:rPr lang="de-DE" dirty="0" smtClean="0"/>
-              <a:t>Deutsches Lexikon (113.439 Zeilen)</a:t>
-            </a:r>
+              <a:t>Alle Wörter mit B (8167 Zeilen</a:t>
+            </a:r>
+            <a:r>
+              <a:rPr lang="de-DE" dirty="0" smtClean="0"/>
+              <a:t>)		    99 kB</a:t>
+            </a:r>
+            <a:endParaRPr lang="de-DE" dirty="0" smtClean="0"/>
           </a:p>
           <a:p>
             <a:pPr lvl="1"/>
             <a:r>
               <a:rPr lang="de-DE" dirty="0" smtClean="0"/>
-              <a:t>Alle Wörter mit B (8167 Zeilen)</a:t>
-            </a:r>
-          </a:p>
-          <a:p>
-            <a:pPr lvl="1"/>
+              <a:t>Links (17395 Zeilen</a:t>
+            </a:r>
             <a:r>
               <a:rPr lang="de-DE" dirty="0" smtClean="0"/>
-              <a:t>Links (17395 Zeilen)</a:t>
-            </a:r>
+              <a:t>)			1181 kB</a:t>
+            </a:r>
+            <a:endParaRPr lang="de-DE" dirty="0" smtClean="0"/>
           </a:p>
           <a:p>
             <a:pPr marL="365760" lvl="1" indent="0">
@@ -7558,7 +7643,7 @@
             <a:pPr lvl="1"/>
             <a:r>
               <a:rPr lang="de-DE" dirty="0" smtClean="0"/>
-              <a:t>Wie viele Kollisionen?</a:t>
+              <a:t>Wie effizient ist das Kollisionsverhalten?</a:t>
             </a:r>
           </a:p>
           <a:p>
@@ -10931,7 +11016,7 @@
         </p:nvSpPr>
         <p:spPr>
           <a:xfrm rot="5400000">
-            <a:off x="1306878" y="4328332"/>
+            <a:off x="1306878" y="4256324"/>
             <a:ext cx="409563" cy="339092"/>
           </a:xfrm>
           <a:prstGeom prst="rightArrow">
@@ -11172,7 +11257,7 @@
           <a:p>
             <a:r>
               <a:rPr lang="de-DE" dirty="0" smtClean="0"/>
-              <a:t>9984…</a:t>
+              <a:t>9014…</a:t>
             </a:r>
             <a:endParaRPr lang="de-DE" dirty="0"/>
           </a:p>
@@ -11188,7 +11273,7 @@
         </p:nvSpPr>
         <p:spPr bwMode="auto">
           <a:xfrm>
-            <a:off x="1013720" y="3942348"/>
+            <a:off x="996755" y="3907221"/>
             <a:ext cx="893984" cy="251151"/>
           </a:xfrm>
           <a:custGeom>
@@ -11331,7 +11416,7 @@
         </p:nvSpPr>
         <p:spPr>
           <a:xfrm>
-            <a:off x="1065603" y="3861048"/>
+            <a:off x="1065602" y="3851756"/>
             <a:ext cx="1058125" cy="369332"/>
           </a:xfrm>
           <a:prstGeom prst="rect">
@@ -11348,6 +11433,436 @@
             <a:r>
               <a:rPr lang="de-DE" dirty="0" smtClean="0"/>
               <a:t>0142…</a:t>
+            </a:r>
+            <a:endParaRPr lang="de-DE" dirty="0"/>
+          </a:p>
+        </p:txBody>
+      </p:sp>
+      <p:sp>
+        <p:nvSpPr>
+          <p:cNvPr id="28" name="Pfeil nach rechts 27"/>
+          <p:cNvSpPr/>
+          <p:nvPr/>
+        </p:nvSpPr>
+        <p:spPr>
+          <a:xfrm rot="5400000">
+            <a:off x="3211528" y="4319038"/>
+            <a:ext cx="409563" cy="339092"/>
+          </a:xfrm>
+          <a:prstGeom prst="rightArrow">
+            <a:avLst/>
+          </a:prstGeom>
+        </p:spPr>
+        <p:style>
+          <a:lnRef idx="2">
+            <a:schemeClr val="accent5">
+              <a:shade val="50000"/>
+            </a:schemeClr>
+          </a:lnRef>
+          <a:fillRef idx="1">
+            <a:schemeClr val="accent5"/>
+          </a:fillRef>
+          <a:effectRef idx="0">
+            <a:schemeClr val="accent5"/>
+          </a:effectRef>
+          <a:fontRef idx="minor">
+            <a:schemeClr val="lt1"/>
+          </a:fontRef>
+        </p:style>
+        <p:txBody>
+          <a:bodyPr rtlCol="0" anchor="ctr"/>
+          <a:lstStyle/>
+          <a:p>
+            <a:pPr algn="ctr"/>
+            <a:endParaRPr lang="de-DE"/>
+          </a:p>
+        </p:txBody>
+      </p:sp>
+      <p:sp>
+        <p:nvSpPr>
+          <p:cNvPr id="29" name="Document"/>
+          <p:cNvSpPr>
+            <a:spLocks noEditPoints="1" noChangeArrowheads="1"/>
+          </p:cNvSpPr>
+          <p:nvPr/>
+        </p:nvSpPr>
+        <p:spPr bwMode="auto">
+          <a:xfrm>
+            <a:off x="2918370" y="3933054"/>
+            <a:ext cx="893984" cy="251151"/>
+          </a:xfrm>
+          <a:custGeom>
+            <a:avLst/>
+            <a:gdLst>
+              <a:gd name="T0" fmla="*/ 10757 w 21600"/>
+              <a:gd name="T1" fmla="*/ 21632 h 21600"/>
+              <a:gd name="T2" fmla="*/ 85 w 21600"/>
+              <a:gd name="T3" fmla="*/ 10849 h 21600"/>
+              <a:gd name="T4" fmla="*/ 10757 w 21600"/>
+              <a:gd name="T5" fmla="*/ 81 h 21600"/>
+              <a:gd name="T6" fmla="*/ 21706 w 21600"/>
+              <a:gd name="T7" fmla="*/ 10652 h 21600"/>
+              <a:gd name="T8" fmla="*/ 10757 w 21600"/>
+              <a:gd name="T9" fmla="*/ 21632 h 21600"/>
+              <a:gd name="T10" fmla="*/ 0 w 21600"/>
+              <a:gd name="T11" fmla="*/ 0 h 21600"/>
+              <a:gd name="T12" fmla="*/ 21600 w 21600"/>
+              <a:gd name="T13" fmla="*/ 0 h 21600"/>
+              <a:gd name="T14" fmla="*/ 21600 w 21600"/>
+              <a:gd name="T15" fmla="*/ 21600 h 21600"/>
+              <a:gd name="T16" fmla="*/ 977 w 21600"/>
+              <a:gd name="T17" fmla="*/ 818 h 21600"/>
+              <a:gd name="T18" fmla="*/ 20622 w 21600"/>
+              <a:gd name="T19" fmla="*/ 16429 h 21600"/>
+            </a:gdLst>
+            <a:ahLst/>
+            <a:cxnLst>
+              <a:cxn ang="0">
+                <a:pos x="T0" y="T1"/>
+              </a:cxn>
+              <a:cxn ang="0">
+                <a:pos x="T2" y="T3"/>
+              </a:cxn>
+              <a:cxn ang="0">
+                <a:pos x="T4" y="T5"/>
+              </a:cxn>
+              <a:cxn ang="0">
+                <a:pos x="T6" y="T7"/>
+              </a:cxn>
+              <a:cxn ang="0">
+                <a:pos x="T8" y="T9"/>
+              </a:cxn>
+              <a:cxn ang="0">
+                <a:pos x="T10" y="T11"/>
+              </a:cxn>
+              <a:cxn ang="0">
+                <a:pos x="T12" y="T13"/>
+              </a:cxn>
+              <a:cxn ang="0">
+                <a:pos x="T14" y="T15"/>
+              </a:cxn>
+            </a:cxnLst>
+            <a:rect l="T16" t="T17" r="T18" b="T19"/>
+            <a:pathLst>
+              <a:path w="21600" h="21600">
+                <a:moveTo>
+                  <a:pt x="10757" y="21632"/>
+                </a:moveTo>
+                <a:lnTo>
+                  <a:pt x="5187" y="21632"/>
+                </a:lnTo>
+                <a:lnTo>
+                  <a:pt x="85" y="17509"/>
+                </a:lnTo>
+                <a:lnTo>
+                  <a:pt x="85" y="10849"/>
+                </a:lnTo>
+                <a:lnTo>
+                  <a:pt x="85" y="81"/>
+                </a:lnTo>
+                <a:lnTo>
+                  <a:pt x="10757" y="81"/>
+                </a:lnTo>
+                <a:lnTo>
+                  <a:pt x="21706" y="81"/>
+                </a:lnTo>
+                <a:lnTo>
+                  <a:pt x="21706" y="10652"/>
+                </a:lnTo>
+                <a:lnTo>
+                  <a:pt x="21706" y="21632"/>
+                </a:lnTo>
+                <a:lnTo>
+                  <a:pt x="10757" y="21632"/>
+                </a:lnTo>
+                <a:close/>
+              </a:path>
+              <a:path w="21600" h="21600">
+                <a:moveTo>
+                  <a:pt x="85" y="17509"/>
+                </a:moveTo>
+                <a:lnTo>
+                  <a:pt x="5187" y="17509"/>
+                </a:lnTo>
+                <a:lnTo>
+                  <a:pt x="5187" y="21632"/>
+                </a:lnTo>
+                <a:lnTo>
+                  <a:pt x="85" y="17509"/>
+                </a:lnTo>
+                <a:close/>
+              </a:path>
+            </a:pathLst>
+          </a:custGeom>
+          <a:solidFill>
+            <a:srgbClr val="D8EBB3"/>
+          </a:solidFill>
+          <a:ln w="9525">
+            <a:solidFill>
+              <a:srgbClr val="000000"/>
+            </a:solidFill>
+            <a:miter lim="800000"/>
+            <a:headEnd/>
+            <a:tailEnd/>
+          </a:ln>
+          <a:effectLst>
+            <a:outerShdw dist="107763" dir="2700000" algn="ctr" rotWithShape="0">
+              <a:srgbClr val="808080"/>
+            </a:outerShdw>
+          </a:effectLst>
+        </p:spPr>
+        <p:txBody>
+          <a:bodyPr vert="horz" wrap="square" lIns="91440" tIns="45720" rIns="91440" bIns="45720" numCol="1" anchor="t" anchorCtr="0" compatLnSpc="1">
+            <a:prstTxWarp prst="textNoShape">
+              <a:avLst/>
+            </a:prstTxWarp>
+          </a:bodyPr>
+          <a:lstStyle/>
+          <a:p>
+            <a:endParaRPr lang="de-DE"/>
+          </a:p>
+        </p:txBody>
+      </p:sp>
+      <p:sp>
+        <p:nvSpPr>
+          <p:cNvPr id="30" name="Pfeil nach rechts 29"/>
+          <p:cNvSpPr/>
+          <p:nvPr/>
+        </p:nvSpPr>
+        <p:spPr>
+          <a:xfrm rot="5400000">
+            <a:off x="5030234" y="4319039"/>
+            <a:ext cx="409563" cy="339092"/>
+          </a:xfrm>
+          <a:prstGeom prst="rightArrow">
+            <a:avLst/>
+          </a:prstGeom>
+        </p:spPr>
+        <p:style>
+          <a:lnRef idx="2">
+            <a:schemeClr val="accent5">
+              <a:shade val="50000"/>
+            </a:schemeClr>
+          </a:lnRef>
+          <a:fillRef idx="1">
+            <a:schemeClr val="accent5"/>
+          </a:fillRef>
+          <a:effectRef idx="0">
+            <a:schemeClr val="accent5"/>
+          </a:effectRef>
+          <a:fontRef idx="minor">
+            <a:schemeClr val="lt1"/>
+          </a:fontRef>
+        </p:style>
+        <p:txBody>
+          <a:bodyPr rtlCol="0" anchor="ctr"/>
+          <a:lstStyle/>
+          <a:p>
+            <a:pPr algn="ctr"/>
+            <a:endParaRPr lang="de-DE"/>
+          </a:p>
+        </p:txBody>
+      </p:sp>
+      <p:sp>
+        <p:nvSpPr>
+          <p:cNvPr id="31" name="Document"/>
+          <p:cNvSpPr>
+            <a:spLocks noEditPoints="1" noChangeArrowheads="1"/>
+          </p:cNvSpPr>
+          <p:nvPr/>
+        </p:nvSpPr>
+        <p:spPr bwMode="auto">
+          <a:xfrm>
+            <a:off x="4737076" y="3933055"/>
+            <a:ext cx="893984" cy="251151"/>
+          </a:xfrm>
+          <a:custGeom>
+            <a:avLst/>
+            <a:gdLst>
+              <a:gd name="T0" fmla="*/ 10757 w 21600"/>
+              <a:gd name="T1" fmla="*/ 21632 h 21600"/>
+              <a:gd name="T2" fmla="*/ 85 w 21600"/>
+              <a:gd name="T3" fmla="*/ 10849 h 21600"/>
+              <a:gd name="T4" fmla="*/ 10757 w 21600"/>
+              <a:gd name="T5" fmla="*/ 81 h 21600"/>
+              <a:gd name="T6" fmla="*/ 21706 w 21600"/>
+              <a:gd name="T7" fmla="*/ 10652 h 21600"/>
+              <a:gd name="T8" fmla="*/ 10757 w 21600"/>
+              <a:gd name="T9" fmla="*/ 21632 h 21600"/>
+              <a:gd name="T10" fmla="*/ 0 w 21600"/>
+              <a:gd name="T11" fmla="*/ 0 h 21600"/>
+              <a:gd name="T12" fmla="*/ 21600 w 21600"/>
+              <a:gd name="T13" fmla="*/ 0 h 21600"/>
+              <a:gd name="T14" fmla="*/ 21600 w 21600"/>
+              <a:gd name="T15" fmla="*/ 21600 h 21600"/>
+              <a:gd name="T16" fmla="*/ 977 w 21600"/>
+              <a:gd name="T17" fmla="*/ 818 h 21600"/>
+              <a:gd name="T18" fmla="*/ 20622 w 21600"/>
+              <a:gd name="T19" fmla="*/ 16429 h 21600"/>
+            </a:gdLst>
+            <a:ahLst/>
+            <a:cxnLst>
+              <a:cxn ang="0">
+                <a:pos x="T0" y="T1"/>
+              </a:cxn>
+              <a:cxn ang="0">
+                <a:pos x="T2" y="T3"/>
+              </a:cxn>
+              <a:cxn ang="0">
+                <a:pos x="T4" y="T5"/>
+              </a:cxn>
+              <a:cxn ang="0">
+                <a:pos x="T6" y="T7"/>
+              </a:cxn>
+              <a:cxn ang="0">
+                <a:pos x="T8" y="T9"/>
+              </a:cxn>
+              <a:cxn ang="0">
+                <a:pos x="T10" y="T11"/>
+              </a:cxn>
+              <a:cxn ang="0">
+                <a:pos x="T12" y="T13"/>
+              </a:cxn>
+              <a:cxn ang="0">
+                <a:pos x="T14" y="T15"/>
+              </a:cxn>
+            </a:cxnLst>
+            <a:rect l="T16" t="T17" r="T18" b="T19"/>
+            <a:pathLst>
+              <a:path w="21600" h="21600">
+                <a:moveTo>
+                  <a:pt x="10757" y="21632"/>
+                </a:moveTo>
+                <a:lnTo>
+                  <a:pt x="5187" y="21632"/>
+                </a:lnTo>
+                <a:lnTo>
+                  <a:pt x="85" y="17509"/>
+                </a:lnTo>
+                <a:lnTo>
+                  <a:pt x="85" y="10849"/>
+                </a:lnTo>
+                <a:lnTo>
+                  <a:pt x="85" y="81"/>
+                </a:lnTo>
+                <a:lnTo>
+                  <a:pt x="10757" y="81"/>
+                </a:lnTo>
+                <a:lnTo>
+                  <a:pt x="21706" y="81"/>
+                </a:lnTo>
+                <a:lnTo>
+                  <a:pt x="21706" y="10652"/>
+                </a:lnTo>
+                <a:lnTo>
+                  <a:pt x="21706" y="21632"/>
+                </a:lnTo>
+                <a:lnTo>
+                  <a:pt x="10757" y="21632"/>
+                </a:lnTo>
+                <a:close/>
+              </a:path>
+              <a:path w="21600" h="21600">
+                <a:moveTo>
+                  <a:pt x="85" y="17509"/>
+                </a:moveTo>
+                <a:lnTo>
+                  <a:pt x="5187" y="17509"/>
+                </a:lnTo>
+                <a:lnTo>
+                  <a:pt x="5187" y="21632"/>
+                </a:lnTo>
+                <a:lnTo>
+                  <a:pt x="85" y="17509"/>
+                </a:lnTo>
+                <a:close/>
+              </a:path>
+            </a:pathLst>
+          </a:custGeom>
+          <a:solidFill>
+            <a:srgbClr val="D8EBB3"/>
+          </a:solidFill>
+          <a:ln w="9525">
+            <a:solidFill>
+              <a:srgbClr val="000000"/>
+            </a:solidFill>
+            <a:miter lim="800000"/>
+            <a:headEnd/>
+            <a:tailEnd/>
+          </a:ln>
+          <a:effectLst>
+            <a:outerShdw dist="107763" dir="2700000" algn="ctr" rotWithShape="0">
+              <a:srgbClr val="808080"/>
+            </a:outerShdw>
+          </a:effectLst>
+        </p:spPr>
+        <p:txBody>
+          <a:bodyPr vert="horz" wrap="square" lIns="91440" tIns="45720" rIns="91440" bIns="45720" numCol="1" anchor="t" anchorCtr="0" compatLnSpc="1">
+            <a:prstTxWarp prst="textNoShape">
+              <a:avLst/>
+            </a:prstTxWarp>
+          </a:bodyPr>
+          <a:lstStyle/>
+          <a:p>
+            <a:endParaRPr lang="de-DE"/>
+          </a:p>
+        </p:txBody>
+      </p:sp>
+      <p:sp>
+        <p:nvSpPr>
+          <p:cNvPr id="32" name="Textfeld 31"/>
+          <p:cNvSpPr txBox="1"/>
+          <p:nvPr/>
+        </p:nvSpPr>
+        <p:spPr>
+          <a:xfrm>
+            <a:off x="3002351" y="3856838"/>
+            <a:ext cx="1058125" cy="369332"/>
+          </a:xfrm>
+          <a:prstGeom prst="rect">
+            <a:avLst/>
+          </a:prstGeom>
+          <a:noFill/>
+        </p:spPr>
+        <p:txBody>
+          <a:bodyPr wrap="square" rtlCol="0">
+            <a:spAutoFit/>
+          </a:bodyPr>
+          <a:lstStyle/>
+          <a:p>
+            <a:r>
+              <a:rPr lang="de-DE" dirty="0" smtClean="0"/>
+              <a:t>3224…</a:t>
+            </a:r>
+            <a:endParaRPr lang="de-DE" dirty="0"/>
+          </a:p>
+        </p:txBody>
+      </p:sp>
+      <p:sp>
+        <p:nvSpPr>
+          <p:cNvPr id="33" name="Textfeld 32"/>
+          <p:cNvSpPr txBox="1"/>
+          <p:nvPr/>
+        </p:nvSpPr>
+        <p:spPr>
+          <a:xfrm>
+            <a:off x="4810019" y="3851756"/>
+            <a:ext cx="1058125" cy="369332"/>
+          </a:xfrm>
+          <a:prstGeom prst="rect">
+            <a:avLst/>
+          </a:prstGeom>
+          <a:noFill/>
+        </p:spPr>
+        <p:txBody>
+          <a:bodyPr wrap="square" rtlCol="0">
+            <a:spAutoFit/>
+          </a:bodyPr>
+          <a:lstStyle/>
+          <a:p>
+            <a:r>
+              <a:rPr lang="de-DE" dirty="0" smtClean="0"/>
+              <a:t>6410…</a:t>
             </a:r>
             <a:endParaRPr lang="de-DE" dirty="0"/>
           </a:p>

</xml_diff>